<commit_message>
Text Classifier TF Hub
</commit_message>
<xml_diff>
--- a/04_BasicImageClassifier.pptx
+++ b/04_BasicImageClassifier.pptx
@@ -238,7 +238,7 @@
             <a:fld id="{6837EDA8-41C8-4B24-A206-13C08A65A6D7}" type="datetimeFigureOut">
               <a:rPr lang="zh-TW" altLang="en-US" smtClean="0"/>
               <a:pPr/>
-              <a:t>2020/5/10</a:t>
+              <a:t>2020/5/11</a:t>
             </a:fld>
             <a:endParaRPr lang="zh-TW" altLang="en-US"/>
           </a:p>
@@ -691,7 +691,7 @@
             <a:fld id="{8B85509C-BD4F-47BF-9B1E-FC2E949B3621}" type="datetime1">
               <a:rPr lang="zh-TW" altLang="en-US" smtClean="0"/>
               <a:pPr/>
-              <a:t>2020/5/10</a:t>
+              <a:t>2020/5/11</a:t>
             </a:fld>
             <a:endParaRPr lang="zh-TW" altLang="en-US"/>
           </a:p>
@@ -864,7 +864,7 @@
             <a:fld id="{42251B24-F787-4C15-8A0F-7AEC20C70069}" type="datetime1">
               <a:rPr lang="zh-TW" altLang="en-US" smtClean="0"/>
               <a:pPr/>
-              <a:t>2020/5/10</a:t>
+              <a:t>2020/5/11</a:t>
             </a:fld>
             <a:endParaRPr lang="zh-TW" altLang="en-US"/>
           </a:p>
@@ -1039,7 +1039,7 @@
             <a:fld id="{9CA0D33C-CE2B-45F1-B8D4-FFD1F131F331}" type="datetime1">
               <a:rPr lang="zh-TW" altLang="en-US" smtClean="0"/>
               <a:pPr/>
-              <a:t>2020/5/10</a:t>
+              <a:t>2020/5/11</a:t>
             </a:fld>
             <a:endParaRPr lang="zh-TW" altLang="en-US"/>
           </a:p>
@@ -1204,7 +1204,7 @@
             <a:fld id="{50B99440-D9EF-40CC-9B52-F6428D9B2C76}" type="datetime1">
               <a:rPr lang="zh-TW" altLang="en-US" smtClean="0"/>
               <a:pPr/>
-              <a:t>2020/5/10</a:t>
+              <a:t>2020/5/11</a:t>
             </a:fld>
             <a:endParaRPr lang="zh-TW" altLang="en-US"/>
           </a:p>
@@ -1446,7 +1446,7 @@
             <a:fld id="{0871BF52-5C6C-4959-8E27-CECB68D39FE4}" type="datetime1">
               <a:rPr lang="zh-TW" altLang="en-US" smtClean="0"/>
               <a:pPr/>
-              <a:t>2020/5/10</a:t>
+              <a:t>2020/5/11</a:t>
             </a:fld>
             <a:endParaRPr lang="zh-TW" altLang="en-US"/>
           </a:p>
@@ -1728,7 +1728,7 @@
             <a:fld id="{DF863F05-2DD9-4EB1-A827-12FD992DE9DC}" type="datetime1">
               <a:rPr lang="zh-TW" altLang="en-US" smtClean="0"/>
               <a:pPr/>
-              <a:t>2020/5/10</a:t>
+              <a:t>2020/5/11</a:t>
             </a:fld>
             <a:endParaRPr lang="zh-TW" altLang="en-US"/>
           </a:p>
@@ -2144,7 +2144,7 @@
             <a:fld id="{6339AF51-4491-4873-A096-75DB6CE47516}" type="datetime1">
               <a:rPr lang="zh-TW" altLang="en-US" smtClean="0"/>
               <a:pPr/>
-              <a:t>2020/5/10</a:t>
+              <a:t>2020/5/11</a:t>
             </a:fld>
             <a:endParaRPr lang="zh-TW" altLang="en-US"/>
           </a:p>
@@ -2258,7 +2258,7 @@
             <a:fld id="{EE4AD9C8-8B9E-40FF-ABE2-858AC2057BBB}" type="datetime1">
               <a:rPr lang="zh-TW" altLang="en-US" smtClean="0"/>
               <a:pPr/>
-              <a:t>2020/5/10</a:t>
+              <a:t>2020/5/11</a:t>
             </a:fld>
             <a:endParaRPr lang="zh-TW" altLang="en-US"/>
           </a:p>
@@ -2350,7 +2350,7 @@
             <a:fld id="{B4784999-BBBE-4BE4-A8D0-877E7D1D66CC}" type="datetime1">
               <a:rPr lang="zh-TW" altLang="en-US" smtClean="0"/>
               <a:pPr/>
-              <a:t>2020/5/10</a:t>
+              <a:t>2020/5/11</a:t>
             </a:fld>
             <a:endParaRPr lang="zh-TW" altLang="en-US"/>
           </a:p>
@@ -2622,7 +2622,7 @@
             <a:fld id="{E88D17E6-02BD-4944-B9FE-7BFCCBF83D48}" type="datetime1">
               <a:rPr lang="zh-TW" altLang="en-US" smtClean="0"/>
               <a:pPr/>
-              <a:t>2020/5/10</a:t>
+              <a:t>2020/5/11</a:t>
             </a:fld>
             <a:endParaRPr lang="zh-TW" altLang="en-US"/>
           </a:p>
@@ -2871,7 +2871,7 @@
             <a:fld id="{3C13E23D-1FEF-4D78-A3A3-3D6F2BB31954}" type="datetime1">
               <a:rPr lang="zh-TW" altLang="en-US" smtClean="0"/>
               <a:pPr/>
-              <a:t>2020/5/10</a:t>
+              <a:t>2020/5/11</a:t>
             </a:fld>
             <a:endParaRPr lang="zh-TW" altLang="en-US"/>
           </a:p>
@@ -3079,7 +3079,7 @@
             <a:fld id="{06197F35-AD6F-4594-8B50-334492D2E7E8}" type="datetime1">
               <a:rPr lang="zh-TW" altLang="en-US" smtClean="0"/>
               <a:pPr/>
-              <a:t>2020/5/10</a:t>
+              <a:t>2020/5/11</a:t>
             </a:fld>
             <a:endParaRPr lang="zh-TW" altLang="en-US"/>
           </a:p>
@@ -3540,7 +3540,7 @@
             <a:fld id="{C389EDC9-19E3-47AC-9C57-C6A24DEA81AD}" type="datetime1">
               <a:rPr lang="zh-TW" altLang="en-US" smtClean="0"/>
               <a:pPr/>
-              <a:t>2020/5/10</a:t>
+              <a:t>2020/5/11</a:t>
             </a:fld>
             <a:endParaRPr lang="zh-TW" altLang="en-US"/>
           </a:p>
@@ -3865,7 +3865,7 @@
             <a:fld id="{A4F910E6-8D00-4BAF-8C48-9688E0B449D3}" type="datetime1">
               <a:rPr lang="zh-TW" altLang="en-US" smtClean="0"/>
               <a:pPr/>
-              <a:t>2020/5/10</a:t>
+              <a:t>2020/5/11</a:t>
             </a:fld>
             <a:endParaRPr lang="zh-TW" altLang="en-US"/>
           </a:p>
@@ -4430,7 +4430,7 @@
             <a:fld id="{A4F910E6-8D00-4BAF-8C48-9688E0B449D3}" type="datetime1">
               <a:rPr lang="zh-TW" altLang="en-US" smtClean="0"/>
               <a:pPr/>
-              <a:t>2020/5/10</a:t>
+              <a:t>2020/5/11</a:t>
             </a:fld>
             <a:endParaRPr lang="zh-TW" altLang="en-US"/>
           </a:p>
@@ -4865,7 +4865,7 @@
             <a:fld id="{A4F910E6-8D00-4BAF-8C48-9688E0B449D3}" type="datetime1">
               <a:rPr lang="zh-TW" altLang="en-US" smtClean="0"/>
               <a:pPr/>
-              <a:t>2020/5/10</a:t>
+              <a:t>2020/5/11</a:t>
             </a:fld>
             <a:endParaRPr lang="zh-TW" altLang="en-US"/>
           </a:p>
@@ -5219,7 +5219,7 @@
             <a:fld id="{A4F910E6-8D00-4BAF-8C48-9688E0B449D3}" type="datetime1">
               <a:rPr lang="zh-TW" altLang="en-US" smtClean="0"/>
               <a:pPr/>
-              <a:t>2020/5/10</a:t>
+              <a:t>2020/5/11</a:t>
             </a:fld>
             <a:endParaRPr lang="zh-TW" altLang="en-US"/>
           </a:p>
@@ -5840,7 +5840,7 @@
         </p:nvSpPr>
         <p:spPr>
           <a:xfrm>
-            <a:off x="2812402" y="2715156"/>
+            <a:off x="2500619" y="2743771"/>
             <a:ext cx="216024" cy="216024"/>
           </a:xfrm>
           <a:prstGeom prst="ellipse">
@@ -5886,7 +5886,7 @@
         </p:nvSpPr>
         <p:spPr>
           <a:xfrm>
-            <a:off x="2812402" y="3183208"/>
+            <a:off x="2500619" y="3211823"/>
             <a:ext cx="216024" cy="216024"/>
           </a:xfrm>
           <a:prstGeom prst="ellipse">
@@ -5932,7 +5932,7 @@
         </p:nvSpPr>
         <p:spPr>
           <a:xfrm>
-            <a:off x="2812402" y="4551360"/>
+            <a:off x="2500619" y="4579975"/>
             <a:ext cx="216024" cy="216024"/>
           </a:xfrm>
           <a:prstGeom prst="ellipse">
@@ -6057,7 +6057,7 @@
         </p:nvSpPr>
         <p:spPr>
           <a:xfrm>
-            <a:off x="2627785" y="3458855"/>
+            <a:off x="2337500" y="3458610"/>
             <a:ext cx="576063" cy="888865"/>
           </a:xfrm>
           <a:prstGeom prst="rect">
@@ -6193,7 +6193,7 @@
         </p:nvSpPr>
         <p:spPr>
           <a:xfrm>
-            <a:off x="2294613" y="2715156"/>
+            <a:off x="2737428" y="2683009"/>
             <a:ext cx="376419" cy="365125"/>
           </a:xfrm>
           <a:prstGeom prst="rect">
@@ -6250,7 +6250,7 @@
         </p:nvSpPr>
         <p:spPr>
           <a:xfrm>
-            <a:off x="2308987" y="3152267"/>
+            <a:off x="2751802" y="3120120"/>
             <a:ext cx="376419" cy="365125"/>
           </a:xfrm>
           <a:prstGeom prst="rect">
@@ -6307,7 +6307,7 @@
         </p:nvSpPr>
         <p:spPr>
           <a:xfrm>
-            <a:off x="2209164" y="4504035"/>
+            <a:off x="2722965" y="4414006"/>
             <a:ext cx="576063" cy="365125"/>
           </a:xfrm>
           <a:prstGeom prst="rect">
@@ -6364,7 +6364,7 @@
         </p:nvSpPr>
         <p:spPr>
           <a:xfrm>
-            <a:off x="3879094" y="2780928"/>
+            <a:off x="3642759" y="2771377"/>
             <a:ext cx="216024" cy="216024"/>
           </a:xfrm>
           <a:prstGeom prst="ellipse">
@@ -6410,7 +6410,7 @@
         </p:nvSpPr>
         <p:spPr>
           <a:xfrm>
-            <a:off x="3879094" y="3248980"/>
+            <a:off x="3642759" y="3239429"/>
             <a:ext cx="216024" cy="216024"/>
           </a:xfrm>
           <a:prstGeom prst="ellipse">
@@ -6456,7 +6456,7 @@
         </p:nvSpPr>
         <p:spPr>
           <a:xfrm>
-            <a:off x="3879094" y="4317779"/>
+            <a:off x="3642759" y="4308228"/>
             <a:ext cx="216024" cy="216024"/>
           </a:xfrm>
           <a:prstGeom prst="ellipse">
@@ -6502,7 +6502,7 @@
         </p:nvSpPr>
         <p:spPr>
           <a:xfrm>
-            <a:off x="3694477" y="3524627"/>
+            <a:off x="3458142" y="3515076"/>
             <a:ext cx="576063" cy="624453"/>
           </a:xfrm>
           <a:prstGeom prst="rect">
@@ -6570,7 +6570,7 @@
         </p:nvSpPr>
         <p:spPr>
           <a:xfrm>
-            <a:off x="3361305" y="2780928"/>
+            <a:off x="3869360" y="2710657"/>
             <a:ext cx="376419" cy="365125"/>
           </a:xfrm>
           <a:prstGeom prst="rect">
@@ -6627,7 +6627,7 @@
         </p:nvSpPr>
         <p:spPr>
           <a:xfrm>
-            <a:off x="3375679" y="3218039"/>
+            <a:off x="3883734" y="3147768"/>
             <a:ext cx="376419" cy="365125"/>
           </a:xfrm>
           <a:prstGeom prst="rect">
@@ -6684,7 +6684,7 @@
         </p:nvSpPr>
         <p:spPr>
           <a:xfrm>
-            <a:off x="3310767" y="4273105"/>
+            <a:off x="3818822" y="4202834"/>
             <a:ext cx="576063" cy="365125"/>
           </a:xfrm>
           <a:prstGeom prst="rect">
@@ -7249,7 +7249,7 @@
             <a:fld id="{A4F910E6-8D00-4BAF-8C48-9688E0B449D3}" type="datetime1">
               <a:rPr lang="zh-TW" altLang="en-US" smtClean="0"/>
               <a:pPr/>
-              <a:t>2020/5/10</a:t>
+              <a:t>2020/5/11</a:t>
             </a:fld>
             <a:endParaRPr lang="zh-TW" altLang="en-US"/>
           </a:p>
@@ -7796,7 +7796,7 @@
             <a:fld id="{A4F910E6-8D00-4BAF-8C48-9688E0B449D3}" type="datetime1">
               <a:rPr lang="zh-TW" altLang="en-US" smtClean="0"/>
               <a:pPr/>
-              <a:t>2020/5/10</a:t>
+              <a:t>2020/5/11</a:t>
             </a:fld>
             <a:endParaRPr lang="zh-TW" altLang="en-US"/>
           </a:p>
@@ -8342,7 +8342,7 @@
             <a:fld id="{A4F910E6-8D00-4BAF-8C48-9688E0B449D3}" type="datetime1">
               <a:rPr lang="zh-TW" altLang="en-US" smtClean="0"/>
               <a:pPr/>
-              <a:t>2020/5/10</a:t>
+              <a:t>2020/5/11</a:t>
             </a:fld>
             <a:endParaRPr lang="zh-TW" altLang="en-US"/>
           </a:p>
@@ -9172,7 +9172,7 @@
             <a:fld id="{A4F910E6-8D00-4BAF-8C48-9688E0B449D3}" type="datetime1">
               <a:rPr lang="zh-TW" altLang="en-US" smtClean="0"/>
               <a:pPr/>
-              <a:t>2020/5/10</a:t>
+              <a:t>2020/5/11</a:t>
             </a:fld>
             <a:endParaRPr lang="zh-TW" altLang="en-US"/>
           </a:p>
@@ -10099,7 +10099,7 @@
             <a:fld id="{A4F910E6-8D00-4BAF-8C48-9688E0B449D3}" type="datetime1">
               <a:rPr lang="zh-TW" altLang="en-US" smtClean="0"/>
               <a:pPr/>
-              <a:t>2020/5/10</a:t>
+              <a:t>2020/5/11</a:t>
             </a:fld>
             <a:endParaRPr lang="zh-TW" altLang="en-US"/>
           </a:p>
@@ -10790,7 +10790,7 @@
             <a:fld id="{A4F910E6-8D00-4BAF-8C48-9688E0B449D3}" type="datetime1">
               <a:rPr lang="zh-TW" altLang="en-US" smtClean="0"/>
               <a:pPr/>
-              <a:t>2020/5/10</a:t>
+              <a:t>2020/5/11</a:t>
             </a:fld>
             <a:endParaRPr lang="zh-TW" altLang="en-US"/>
           </a:p>
@@ -11358,7 +11358,7 @@
             <a:fld id="{A4F910E6-8D00-4BAF-8C48-9688E0B449D3}" type="datetime1">
               <a:rPr lang="zh-TW" altLang="en-US" smtClean="0"/>
               <a:pPr/>
-              <a:t>2020/5/10</a:t>
+              <a:t>2020/5/11</a:t>
             </a:fld>
             <a:endParaRPr lang="zh-TW" altLang="en-US"/>
           </a:p>
@@ -11744,7 +11744,7 @@
             <a:fld id="{A4F910E6-8D00-4BAF-8C48-9688E0B449D3}" type="datetime1">
               <a:rPr lang="zh-TW" altLang="en-US" smtClean="0"/>
               <a:pPr/>
-              <a:t>2020/5/10</a:t>
+              <a:t>2020/5/11</a:t>
             </a:fld>
             <a:endParaRPr lang="zh-TW" altLang="en-US"/>
           </a:p>
@@ -12352,7 +12352,7 @@
             <a:fld id="{A4F910E6-8D00-4BAF-8C48-9688E0B449D3}" type="datetime1">
               <a:rPr lang="zh-TW" altLang="en-US" smtClean="0"/>
               <a:pPr/>
-              <a:t>2020/5/10</a:t>
+              <a:t>2020/5/11</a:t>
             </a:fld>
             <a:endParaRPr lang="zh-TW" altLang="en-US"/>
           </a:p>
@@ -13222,7 +13222,7 @@
             <a:fld id="{A4F910E6-8D00-4BAF-8C48-9688E0B449D3}" type="datetime1">
               <a:rPr lang="zh-TW" altLang="en-US" smtClean="0"/>
               <a:pPr/>
-              <a:t>2020/5/10</a:t>
+              <a:t>2020/5/11</a:t>
             </a:fld>
             <a:endParaRPr lang="zh-TW" altLang="en-US"/>
           </a:p>
@@ -14126,7 +14126,7 @@
             <a:fld id="{A4F910E6-8D00-4BAF-8C48-9688E0B449D3}" type="datetime1">
               <a:rPr lang="zh-TW" altLang="en-US" smtClean="0"/>
               <a:pPr/>
-              <a:t>2020/5/10</a:t>
+              <a:t>2020/5/11</a:t>
             </a:fld>
             <a:endParaRPr lang="zh-TW" altLang="en-US"/>
           </a:p>
@@ -14550,7 +14550,7 @@
             <a:fld id="{A4F910E6-8D00-4BAF-8C48-9688E0B449D3}" type="datetime1">
               <a:rPr lang="zh-TW" altLang="en-US" smtClean="0"/>
               <a:pPr/>
-              <a:t>2020/5/10</a:t>
+              <a:t>2020/5/11</a:t>
             </a:fld>
             <a:endParaRPr lang="zh-TW" altLang="en-US"/>
           </a:p>
@@ -14974,7 +14974,7 @@
             <a:fld id="{A4F910E6-8D00-4BAF-8C48-9688E0B449D3}" type="datetime1">
               <a:rPr lang="zh-TW" altLang="en-US" smtClean="0"/>
               <a:pPr/>
-              <a:t>2020/5/10</a:t>
+              <a:t>2020/5/11</a:t>
             </a:fld>
             <a:endParaRPr lang="zh-TW" altLang="en-US"/>
           </a:p>
@@ -15310,7 +15310,7 @@
             <a:fld id="{A4F910E6-8D00-4BAF-8C48-9688E0B449D3}" type="datetime1">
               <a:rPr lang="zh-TW" altLang="en-US" smtClean="0"/>
               <a:pPr/>
-              <a:t>2020/5/10</a:t>
+              <a:t>2020/5/11</a:t>
             </a:fld>
             <a:endParaRPr lang="zh-TW" altLang="en-US"/>
           </a:p>
@@ -15991,7 +15991,7 @@
             <a:fld id="{A4F910E6-8D00-4BAF-8C48-9688E0B449D3}" type="datetime1">
               <a:rPr lang="zh-TW" altLang="en-US" smtClean="0"/>
               <a:pPr/>
-              <a:t>2020/5/10</a:t>
+              <a:t>2020/5/11</a:t>
             </a:fld>
             <a:endParaRPr lang="zh-TW" altLang="en-US"/>
           </a:p>
@@ -16720,7 +16720,7 @@
             <a:fld id="{A4F910E6-8D00-4BAF-8C48-9688E0B449D3}" type="datetime1">
               <a:rPr lang="zh-TW" altLang="en-US" smtClean="0"/>
               <a:pPr/>
-              <a:t>2020/5/10</a:t>
+              <a:t>2020/5/11</a:t>
             </a:fld>
             <a:endParaRPr lang="zh-TW" altLang="en-US"/>
           </a:p>
@@ -17335,7 +17335,7 @@
             <a:fld id="{A4F910E6-8D00-4BAF-8C48-9688E0B449D3}" type="datetime1">
               <a:rPr lang="zh-TW" altLang="en-US" smtClean="0"/>
               <a:pPr/>
-              <a:t>2020/5/10</a:t>
+              <a:t>2020/5/11</a:t>
             </a:fld>
             <a:endParaRPr lang="zh-TW" altLang="en-US"/>
           </a:p>
@@ -18103,7 +18103,7 @@
             <a:fld id="{A4F910E6-8D00-4BAF-8C48-9688E0B449D3}" type="datetime1">
               <a:rPr lang="zh-TW" altLang="en-US" smtClean="0"/>
               <a:pPr/>
-              <a:t>2020/5/10</a:t>
+              <a:t>2020/5/11</a:t>
             </a:fld>
             <a:endParaRPr lang="zh-TW" altLang="en-US"/>
           </a:p>
@@ -18332,7 +18332,7 @@
             <a:fld id="{4E46BE27-E923-4EC2-B046-3272AE2A3E5C}" type="datetime1">
               <a:rPr lang="zh-TW" altLang="en-US" smtClean="0"/>
               <a:pPr/>
-              <a:t>2020/5/10</a:t>
+              <a:t>2020/5/11</a:t>
             </a:fld>
             <a:endParaRPr lang="zh-TW" altLang="en-US"/>
           </a:p>
@@ -18877,7 +18877,7 @@
             <a:fld id="{A4F910E6-8D00-4BAF-8C48-9688E0B449D3}" type="datetime1">
               <a:rPr lang="zh-TW" altLang="en-US" smtClean="0"/>
               <a:pPr/>
-              <a:t>2020/5/10</a:t>
+              <a:t>2020/5/11</a:t>
             </a:fld>
             <a:endParaRPr lang="zh-TW" altLang="en-US"/>
           </a:p>
@@ -19378,7 +19378,7 @@
             <a:fld id="{A4F910E6-8D00-4BAF-8C48-9688E0B449D3}" type="datetime1">
               <a:rPr lang="zh-TW" altLang="en-US" smtClean="0"/>
               <a:pPr/>
-              <a:t>2020/5/10</a:t>
+              <a:t>2020/5/11</a:t>
             </a:fld>
             <a:endParaRPr lang="zh-TW" altLang="en-US"/>
           </a:p>
@@ -20246,7 +20246,7 @@
             <a:fld id="{A4F910E6-8D00-4BAF-8C48-9688E0B449D3}" type="datetime1">
               <a:rPr lang="zh-TW" altLang="en-US" smtClean="0"/>
               <a:pPr/>
-              <a:t>2020/5/10</a:t>
+              <a:t>2020/5/11</a:t>
             </a:fld>
             <a:endParaRPr lang="zh-TW" altLang="en-US"/>
           </a:p>
@@ -20695,7 +20695,7 @@
             <a:fld id="{A4F910E6-8D00-4BAF-8C48-9688E0B449D3}" type="datetime1">
               <a:rPr lang="zh-TW" altLang="en-US" smtClean="0"/>
               <a:pPr/>
-              <a:t>2020/5/10</a:t>
+              <a:t>2020/5/11</a:t>
             </a:fld>
             <a:endParaRPr lang="zh-TW" altLang="en-US"/>
           </a:p>
@@ -21137,7 +21137,7 @@
             <a:fld id="{A4F910E6-8D00-4BAF-8C48-9688E0B449D3}" type="datetime1">
               <a:rPr lang="zh-TW" altLang="en-US" smtClean="0"/>
               <a:pPr/>
-              <a:t>2020/5/10</a:t>
+              <a:t>2020/5/11</a:t>
             </a:fld>
             <a:endParaRPr lang="zh-TW" altLang="en-US"/>
           </a:p>
@@ -21611,7 +21611,7 @@
             <a:fld id="{A4F910E6-8D00-4BAF-8C48-9688E0B449D3}" type="datetime1">
               <a:rPr lang="zh-TW" altLang="en-US" smtClean="0"/>
               <a:pPr/>
-              <a:t>2020/5/10</a:t>
+              <a:t>2020/5/11</a:t>
             </a:fld>
             <a:endParaRPr lang="zh-TW" altLang="en-US"/>
           </a:p>

</xml_diff>